<commit_message>
added parrallel plot slide
</commit_message>
<xml_diff>
--- a/Thyroid Cancer Recurrence.pptx
+++ b/Thyroid Cancer Recurrence.pptx
@@ -10,8 +10,9 @@
     <p:sldId id="257" r:id="rId4"/>
     <p:sldId id="258" r:id="rId5"/>
     <p:sldId id="259" r:id="rId6"/>
-    <p:sldId id="260" r:id="rId7"/>
-    <p:sldId id="261" r:id="rId8"/>
+    <p:sldId id="263" r:id="rId7"/>
+    <p:sldId id="260" r:id="rId8"/>
+    <p:sldId id="261" r:id="rId9"/>
   </p:sldIdLst>
   <p:sldSz cx="12192000" cy="6858000"/>
   <p:notesSz cx="6858000" cy="9144000"/>
@@ -110,6 +111,11 @@
       </a:defRPr>
     </a:lvl9pPr>
   </p:defaultTextStyle>
+  <p:extLst>
+    <p:ext uri="{EFAFB233-063F-42B5-8137-9DF3F51BA10A}">
+      <p15:sldGuideLst xmlns:p15="http://schemas.microsoft.com/office/powerpoint/2012/main"/>
+    </p:ext>
+  </p:extLst>
 </p:presentation>
 </file>
 
@@ -449,7 +455,7 @@
             <a:fld id="{5923F103-BC34-4FE4-A40E-EDDEECFDA5D0}" type="datetimeFigureOut">
               <a:rPr lang="en-US" dirty="0"/>
               <a:pPr/>
-              <a:t>12/28/2023</a:t>
+              <a:t>12/29/2023</a:t>
             </a:fld>
             <a:endParaRPr lang="en-US" dirty="0"/>
           </a:p>
@@ -1533,7 +1539,7 @@
           <a:p>
             <a:fld id="{923A1CC3-2375-41D4-9E03-427CAF2A4C1A}" type="datetimeFigureOut">
               <a:rPr lang="en-US" dirty="0"/>
-              <a:t>12/28/2023</a:t>
+              <a:t>12/29/2023</a:t>
             </a:fld>
             <a:endParaRPr lang="en-US" dirty="0"/>
           </a:p>
@@ -2509,7 +2515,7 @@
           <a:p>
             <a:fld id="{AFF16868-8199-4C2C-A5B1-63AEE139F88E}" type="datetimeFigureOut">
               <a:rPr lang="en-US" dirty="0"/>
-              <a:t>12/28/2023</a:t>
+              <a:t>12/29/2023</a:t>
             </a:fld>
             <a:endParaRPr lang="en-US" dirty="0"/>
           </a:p>
@@ -3639,7 +3645,7 @@
           <a:p>
             <a:fld id="{AAD9FF7F-6988-44CC-821B-644E70CD2F73}" type="datetimeFigureOut">
               <a:rPr lang="en-US" dirty="0"/>
-              <a:t>12/28/2023</a:t>
+              <a:t>12/29/2023</a:t>
             </a:fld>
             <a:endParaRPr lang="en-US" dirty="0"/>
           </a:p>
@@ -4668,7 +4674,7 @@
           <a:p>
             <a:fld id="{5C12C299-16B2-4475-990D-751901EACC14}" type="datetimeFigureOut">
               <a:rPr lang="en-US" dirty="0"/>
-              <a:t>12/28/2023</a:t>
+              <a:t>12/29/2023</a:t>
             </a:fld>
             <a:endParaRPr lang="en-US" dirty="0"/>
           </a:p>
@@ -5324,7 +5330,7 @@
           <a:p>
             <a:fld id="{9FE86839-B9D8-4651-8783-F325ECE74E65}" type="datetimeFigureOut">
               <a:rPr lang="en-US" dirty="0"/>
-              <a:t>12/28/2023</a:t>
+              <a:t>12/29/2023</a:t>
             </a:fld>
             <a:endParaRPr lang="en-US" dirty="0"/>
           </a:p>
@@ -6181,7 +6187,7 @@
           <a:p>
             <a:fld id="{FD484F64-32F6-45C5-931F-ADC1662401D0}" type="datetimeFigureOut">
               <a:rPr lang="en-US" dirty="0"/>
-              <a:t>12/28/2023</a:t>
+              <a:t>12/29/2023</a:t>
             </a:fld>
             <a:endParaRPr lang="en-US" dirty="0"/>
           </a:p>
@@ -6367,7 +6373,7 @@
           <a:p>
             <a:fld id="{53086D93-FCAC-47E0-A2EE-787E62CA814C}" type="datetimeFigureOut">
               <a:rPr lang="en-US" dirty="0"/>
-              <a:t>12/28/2023</a:t>
+              <a:t>12/29/2023</a:t>
             </a:fld>
             <a:endParaRPr lang="en-US" dirty="0"/>
           </a:p>
@@ -7335,7 +7341,7 @@
           <a:p>
             <a:fld id="{CDA879A6-0FD0-4734-A311-86BFCA472E6E}" type="datetimeFigureOut">
               <a:rPr lang="en-US" dirty="0"/>
-              <a:t>12/28/2023</a:t>
+              <a:t>12/29/2023</a:t>
             </a:fld>
             <a:endParaRPr lang="en-US" dirty="0"/>
           </a:p>
@@ -7542,7 +7548,7 @@
           <a:p>
             <a:fld id="{19C9CA7B-DFD4-44B5-8C60-D14B8CD1FB59}" type="datetimeFigureOut">
               <a:rPr lang="en-US" dirty="0"/>
-              <a:t>12/28/2023</a:t>
+              <a:t>12/29/2023</a:t>
             </a:fld>
             <a:endParaRPr lang="en-US" dirty="0"/>
           </a:p>
@@ -8572,7 +8578,7 @@
           <a:p>
             <a:fld id="{F34E6425-0181-43F2-84FC-787E803FD2F8}" type="datetimeFigureOut">
               <a:rPr lang="en-US" dirty="0"/>
-              <a:t>12/28/2023</a:t>
+              <a:t>12/29/2023</a:t>
             </a:fld>
             <a:endParaRPr lang="en-US" dirty="0"/>
           </a:p>
@@ -8840,7 +8846,7 @@
           <a:p>
             <a:fld id="{3BDB8791-F1B0-41E7-B7FD-A781E65C4266}" type="datetimeFigureOut">
               <a:rPr lang="en-US" dirty="0"/>
-              <a:t>12/28/2023</a:t>
+              <a:t>12/29/2023</a:t>
             </a:fld>
             <a:endParaRPr lang="en-US" dirty="0"/>
           </a:p>
@@ -9246,7 +9252,7 @@
           <a:p>
             <a:fld id="{5FDD63B2-E120-4ED8-B27B-C685F510A5FE}" type="datetimeFigureOut">
               <a:rPr lang="en-US" dirty="0"/>
-              <a:t>12/28/2023</a:t>
+              <a:t>12/29/2023</a:t>
             </a:fld>
             <a:endParaRPr lang="en-US" dirty="0"/>
           </a:p>
@@ -9369,7 +9375,7 @@
           <a:p>
             <a:fld id="{7AA18ACC-A947-437B-A130-35BD54FDF1E9}" type="datetimeFigureOut">
               <a:rPr lang="en-US" dirty="0"/>
-              <a:t>12/28/2023</a:t>
+              <a:t>12/29/2023</a:t>
             </a:fld>
             <a:endParaRPr lang="en-US" dirty="0"/>
           </a:p>
@@ -9460,7 +9466,7 @@
           <a:p>
             <a:fld id="{7C8D7E02-BCB8-4D50-A234-369438C08659}" type="datetimeFigureOut">
               <a:rPr lang="en-US" dirty="0"/>
-              <a:t>12/28/2023</a:t>
+              <a:t>12/29/2023</a:t>
             </a:fld>
             <a:endParaRPr lang="en-US" dirty="0"/>
           </a:p>
@@ -10537,7 +10543,7 @@
           <a:p>
             <a:fld id="{76E86A4C-8E40-4F87-A4F0-01A0687C5742}" type="datetimeFigureOut">
               <a:rPr lang="en-US" dirty="0"/>
-              <a:t>12/28/2023</a:t>
+              <a:t>12/29/2023</a:t>
             </a:fld>
             <a:endParaRPr lang="en-US" dirty="0"/>
           </a:p>
@@ -11641,7 +11647,7 @@
           <a:p>
             <a:fld id="{35E72C73-2D91-4E12-BA25-F0AA0C03599B}" type="datetimeFigureOut">
               <a:rPr lang="en-US" dirty="0"/>
-              <a:t>12/28/2023</a:t>
+              <a:t>12/29/2023</a:t>
             </a:fld>
             <a:endParaRPr lang="en-US" dirty="0"/>
           </a:p>
@@ -12634,7 +12640,7 @@
           <a:p>
             <a:fld id="{2BE451C3-0FF4-47C4-B829-773ADF60F88C}" type="datetimeFigureOut">
               <a:rPr lang="en-US" dirty="0"/>
-              <a:t>12/28/2023</a:t>
+              <a:t>12/29/2023</a:t>
             </a:fld>
             <a:endParaRPr lang="en-US" dirty="0"/>
           </a:p>
@@ -13788,6 +13794,136 @@
             <p:ph type="title"/>
           </p:nvPr>
         </p:nvSpPr>
+        <p:spPr>
+          <a:xfrm>
+            <a:off x="1154954" y="973668"/>
+            <a:ext cx="9417252" cy="706964"/>
+          </a:xfrm>
+        </p:spPr>
+        <p:txBody>
+          <a:bodyPr/>
+          <a:lstStyle/>
+          <a:p>
+            <a:r>
+              <a:rPr lang="" dirty="0" smtClean="0"/>
+              <a:t>Impact of Smoking and/or Radiotherapy</a:t>
+            </a:r>
+            <a:endParaRPr lang="en-IN" dirty="0"/>
+          </a:p>
+        </p:txBody>
+      </p:sp>
+      <p:pic>
+        <p:nvPicPr>
+          <p:cNvPr id="4" name="Content Placeholder 3"/>
+          <p:cNvPicPr>
+            <a:picLocks noGrp="1" noChangeAspect="1"/>
+          </p:cNvPicPr>
+          <p:nvPr>
+            <p:ph idx="1"/>
+          </p:nvPr>
+        </p:nvPicPr>
+        <p:blipFill>
+          <a:blip r:embed="rId2">
+            <a:extLst>
+              <a:ext uri="{28A0092B-C50C-407E-A947-70E740481C1C}">
+                <a14:useLocalDpi xmlns:a14="http://schemas.microsoft.com/office/drawing/2010/main" val="0"/>
+              </a:ext>
+            </a:extLst>
+          </a:blip>
+          <a:stretch>
+            <a:fillRect/>
+          </a:stretch>
+        </p:blipFill>
+        <p:spPr>
+          <a:xfrm>
+            <a:off x="322217" y="2854886"/>
+            <a:ext cx="7702527" cy="2831811"/>
+          </a:xfrm>
+        </p:spPr>
+      </p:pic>
+      <p:sp>
+        <p:nvSpPr>
+          <p:cNvPr id="5" name="TextBox 4"/>
+          <p:cNvSpPr txBox="1"/>
+          <p:nvPr/>
+        </p:nvSpPr>
+        <p:spPr>
+          <a:xfrm>
+            <a:off x="8090263" y="3178629"/>
+            <a:ext cx="3526971" cy="2308324"/>
+          </a:xfrm>
+          <a:prstGeom prst="rect">
+            <a:avLst/>
+          </a:prstGeom>
+          <a:noFill/>
+        </p:spPr>
+        <p:txBody>
+          <a:bodyPr wrap="square" rtlCol="0">
+            <a:spAutoFit/>
+          </a:bodyPr>
+          <a:lstStyle/>
+          <a:p>
+            <a:pPr marL="285750" indent="-285750">
+              <a:buFont typeface="Arial" panose="020B0604020202020204" pitchFamily="34" charset="0"/>
+              <a:buChar char="•"/>
+            </a:pPr>
+            <a:r>
+              <a:rPr lang="" dirty="0" smtClean="0"/>
+              <a:t>This plot shows us that a history of smoking or radiotherapy indicates a higher chance of recurrence.</a:t>
+            </a:r>
+          </a:p>
+          <a:p>
+            <a:pPr marL="285750" indent="-285750">
+              <a:buFont typeface="Arial" panose="020B0604020202020204" pitchFamily="34" charset="0"/>
+              <a:buChar char="•"/>
+            </a:pPr>
+            <a:r>
+              <a:rPr lang="" dirty="0" smtClean="0"/>
+              <a:t>Having swollen lymph nodes puts the patient at risk for a recurrence as well.</a:t>
+            </a:r>
+          </a:p>
+        </p:txBody>
+      </p:sp>
+    </p:spTree>
+    <p:extLst>
+      <p:ext uri="{BB962C8B-B14F-4D97-AF65-F5344CB8AC3E}">
+        <p14:creationId xmlns:p14="http://schemas.microsoft.com/office/powerpoint/2010/main" val="324988713"/>
+      </p:ext>
+    </p:extLst>
+  </p:cSld>
+  <p:clrMapOvr>
+    <a:masterClrMapping/>
+  </p:clrMapOvr>
+</p:sld>
+</file>
+
+<file path=ppt/slides/slide7.xml><?xml version="1.0" encoding="utf-8"?>
+<p:sld xmlns:a="http://schemas.openxmlformats.org/drawingml/2006/main" xmlns:r="http://schemas.openxmlformats.org/officeDocument/2006/relationships" xmlns:p="http://schemas.openxmlformats.org/presentationml/2006/main">
+  <p:cSld>
+    <p:spTree>
+      <p:nvGrpSpPr>
+        <p:cNvPr id="1" name=""/>
+        <p:cNvGrpSpPr/>
+        <p:nvPr/>
+      </p:nvGrpSpPr>
+      <p:grpSpPr>
+        <a:xfrm>
+          <a:off x="0" y="0"/>
+          <a:ext cx="0" cy="0"/>
+          <a:chOff x="0" y="0"/>
+          <a:chExt cx="0" cy="0"/>
+        </a:xfrm>
+      </p:grpSpPr>
+      <p:sp>
+        <p:nvSpPr>
+          <p:cNvPr id="2" name="Title 1"/>
+          <p:cNvSpPr>
+            <a:spLocks noGrp="1"/>
+          </p:cNvSpPr>
+          <p:nvPr>
+            <p:ph type="title"/>
+          </p:nvPr>
+        </p:nvSpPr>
         <p:spPr/>
         <p:txBody>
           <a:bodyPr/>
@@ -13868,7 +14004,7 @@
 </p:sld>
 </file>
 
-<file path=ppt/slides/slide7.xml><?xml version="1.0" encoding="utf-8"?>
+<file path=ppt/slides/slide8.xml><?xml version="1.0" encoding="utf-8"?>
 <p:sld xmlns:a="http://schemas.openxmlformats.org/drawingml/2006/main" xmlns:r="http://schemas.openxmlformats.org/officeDocument/2006/relationships" xmlns:p="http://schemas.openxmlformats.org/presentationml/2006/main">
   <p:cSld>
     <p:spTree>

</xml_diff>